<commit_message>
simulations added to pptx
</commit_message>
<xml_diff>
--- a/documentation/Phase2.pptx
+++ b/documentation/Phase2.pptx
@@ -110,6 +110,22 @@
       </a:defRPr>
     </a:lvl9pPr>
   </p:defaultTextStyle>
+  <p:extLst>
+    <p:ext uri="{EFAFB233-063F-42B5-8137-9DF3F51BA10A}">
+      <p15:sldGuideLst xmlns:p15="http://schemas.microsoft.com/office/powerpoint/2012/main">
+        <p15:guide id="1" orient="horz" pos="2160">
+          <p15:clr>
+            <a:srgbClr val="A4A3A4"/>
+          </p15:clr>
+        </p15:guide>
+        <p15:guide id="2" pos="2880">
+          <p15:clr>
+            <a:srgbClr val="A4A3A4"/>
+          </p15:clr>
+        </p15:guide>
+      </p15:sldGuideLst>
+    </p:ext>
+  </p:extLst>
 </p:presentation>
 </file>
 
@@ -4638,20 +4654,20 @@
             <p:ph type="subTitle" idx="1"/>
           </p:nvPr>
         </p:nvSpPr>
-        <p:spPr/>
+        <p:spPr>
+          <a:xfrm>
+            <a:off x="-3492896" y="1844824"/>
+            <a:ext cx="7772400" cy="1199704"/>
+          </a:xfrm>
+        </p:spPr>
         <p:txBody>
           <a:bodyPr/>
           <a:lstStyle/>
           <a:p>
             <a:r>
               <a:rPr lang="en-NZ" dirty="0" smtClean="0"/>
-              <a:t>Group </a:t>
-            </a:r>
-            <a:r>
-              <a:rPr lang="en-NZ" dirty="0" smtClean="0"/>
-              <a:t>4</a:t>
-            </a:r>
-            <a:endParaRPr lang="en-NZ" dirty="0" smtClean="0"/>
+              <a:t>Group 4</a:t>
+            </a:r>
           </a:p>
         </p:txBody>
       </p:sp>
@@ -4753,12 +4769,12 @@
       </p:grpSpPr>
       <p:sp>
         <p:nvSpPr>
-          <p:cNvPr id="2" name="Content Placeholder 1"/>
-          <p:cNvSpPr>
-            <a:spLocks noGrp="1"/>
-          </p:cNvSpPr>
-          <p:nvPr>
-            <p:ph idx="1"/>
+          <p:cNvPr id="3" name="Title 2"/>
+          <p:cNvSpPr>
+            <a:spLocks noGrp="1"/>
+          </p:cNvSpPr>
+          <p:nvPr>
+            <p:ph type="title"/>
           </p:nvPr>
         </p:nvSpPr>
         <p:spPr/>
@@ -4768,39 +4784,101 @@
           <a:p>
             <a:r>
               <a:rPr lang="en-NZ" dirty="0" smtClean="0"/>
-              <a:t>*insert simulation results here*</a:t>
+              <a:t>Simulation Results</a:t>
             </a:r>
             <a:endParaRPr lang="en-NZ" dirty="0"/>
           </a:p>
         </p:txBody>
       </p:sp>
-      <p:sp>
-        <p:nvSpPr>
-          <p:cNvPr id="3" name="Title 2"/>
-          <p:cNvSpPr>
-            <a:spLocks noGrp="1"/>
-          </p:cNvSpPr>
-          <p:nvPr>
-            <p:ph type="title"/>
-          </p:nvPr>
-        </p:nvSpPr>
-        <p:spPr/>
-        <p:txBody>
-          <a:bodyPr/>
-          <a:lstStyle/>
-          <a:p>
-            <a:r>
-              <a:rPr lang="en-NZ" dirty="0" smtClean="0"/>
-              <a:t>Simulation </a:t>
-            </a:r>
-            <a:r>
-              <a:rPr lang="en-NZ" dirty="0" smtClean="0"/>
-              <a:t>Results</a:t>
-            </a:r>
-            <a:endParaRPr lang="en-NZ" dirty="0"/>
-          </a:p>
-        </p:txBody>
-      </p:sp>
+      <p:pic>
+        <p:nvPicPr>
+          <p:cNvPr id="5" name="Content Placeholder 4"/>
+          <p:cNvPicPr>
+            <a:picLocks noGrp="1" noChangeAspect="1"/>
+          </p:cNvPicPr>
+          <p:nvPr>
+            <p:ph idx="1"/>
+          </p:nvPr>
+        </p:nvPicPr>
+        <p:blipFill>
+          <a:blip r:embed="rId2">
+            <a:extLst>
+              <a:ext uri="{28A0092B-C50C-407E-A947-70E740481C1C}">
+                <a14:useLocalDpi xmlns:a14="http://schemas.microsoft.com/office/drawing/2010/main" val="0"/>
+              </a:ext>
+            </a:extLst>
+          </a:blip>
+          <a:stretch>
+            <a:fillRect/>
+          </a:stretch>
+        </p:blipFill>
+        <p:spPr>
+          <a:xfrm>
+            <a:off x="440113" y="1417638"/>
+            <a:ext cx="8229600" cy="797767"/>
+          </a:xfrm>
+        </p:spPr>
+      </p:pic>
+      <p:pic>
+        <p:nvPicPr>
+          <p:cNvPr id="6" name="Picture 5"/>
+          <p:cNvPicPr>
+            <a:picLocks noChangeAspect="1"/>
+          </p:cNvPicPr>
+          <p:nvPr/>
+        </p:nvPicPr>
+        <p:blipFill>
+          <a:blip r:embed="rId3">
+            <a:extLst>
+              <a:ext uri="{28A0092B-C50C-407E-A947-70E740481C1C}">
+                <a14:useLocalDpi xmlns:a14="http://schemas.microsoft.com/office/drawing/2010/main" val="0"/>
+              </a:ext>
+            </a:extLst>
+          </a:blip>
+          <a:stretch>
+            <a:fillRect/>
+          </a:stretch>
+        </p:blipFill>
+        <p:spPr>
+          <a:xfrm>
+            <a:off x="117216" y="2560638"/>
+            <a:ext cx="8875393" cy="1148061"/>
+          </a:xfrm>
+          <a:prstGeom prst="rect">
+            <a:avLst/>
+          </a:prstGeom>
+        </p:spPr>
+      </p:pic>
+      <p:pic>
+        <p:nvPicPr>
+          <p:cNvPr id="7" name="Picture 6"/>
+          <p:cNvPicPr>
+            <a:picLocks noChangeAspect="1"/>
+          </p:cNvPicPr>
+          <p:nvPr/>
+        </p:nvPicPr>
+        <p:blipFill>
+          <a:blip r:embed="rId4">
+            <a:extLst>
+              <a:ext uri="{28A0092B-C50C-407E-A947-70E740481C1C}">
+                <a14:useLocalDpi xmlns:a14="http://schemas.microsoft.com/office/drawing/2010/main" val="0"/>
+              </a:ext>
+            </a:extLst>
+          </a:blip>
+          <a:stretch>
+            <a:fillRect/>
+          </a:stretch>
+        </p:blipFill>
+        <p:spPr>
+          <a:xfrm>
+            <a:off x="72000" y="4053932"/>
+            <a:ext cx="9000000" cy="830652"/>
+          </a:xfrm>
+          <a:prstGeom prst="rect">
+            <a:avLst/>
+          </a:prstGeom>
+        </p:spPr>
+      </p:pic>
     </p:spTree>
   </p:cSld>
   <p:clrMapOvr>
@@ -4866,11 +4944,7 @@
           <a:p>
             <a:r>
               <a:rPr lang="en-NZ" dirty="0" smtClean="0"/>
-              <a:t>Performance </a:t>
-            </a:r>
-            <a:r>
-              <a:rPr lang="en-NZ" dirty="0" smtClean="0"/>
-              <a:t>Comparison</a:t>
+              <a:t>Performance Comparison</a:t>
             </a:r>
             <a:endParaRPr lang="en-NZ" dirty="0"/>
           </a:p>
@@ -4939,7 +5013,6 @@
               <a:rPr lang="en-NZ" dirty="0" smtClean="0"/>
               <a:t>FPGA responds with a single pixel value</a:t>
             </a:r>
-            <a:endParaRPr lang="en-NZ" dirty="0" smtClean="0"/>
           </a:p>
           <a:p>
             <a:endParaRPr lang="en-NZ" dirty="0" smtClean="0"/>

</xml_diff>

<commit_message>
Added checklist at the start of powerpoint for guidance.
</commit_message>
<xml_diff>
--- a/documentation/Phase2.pptx
+++ b/documentation/Phase2.pptx
@@ -5,13 +5,15 @@
     <p:sldMasterId id="2147483660" r:id="rId1"/>
   </p:sldMasterIdLst>
   <p:sldIdLst>
-    <p:sldId id="256" r:id="rId2"/>
-    <p:sldId id="261" r:id="rId3"/>
-    <p:sldId id="257" r:id="rId4"/>
-    <p:sldId id="258" r:id="rId5"/>
-    <p:sldId id="260" r:id="rId6"/>
-    <p:sldId id="259" r:id="rId7"/>
-    <p:sldId id="263" r:id="rId8"/>
+    <p:sldId id="264" r:id="rId2"/>
+    <p:sldId id="265" r:id="rId3"/>
+    <p:sldId id="256" r:id="rId4"/>
+    <p:sldId id="261" r:id="rId5"/>
+    <p:sldId id="257" r:id="rId6"/>
+    <p:sldId id="258" r:id="rId7"/>
+    <p:sldId id="260" r:id="rId8"/>
+    <p:sldId id="259" r:id="rId9"/>
+    <p:sldId id="263" r:id="rId10"/>
   </p:sldIdLst>
   <p:sldSz cx="9144000" cy="6858000" type="screen4x3"/>
   <p:notesSz cx="6858000" cy="9144000"/>
@@ -112,7 +114,7 @@
   </p:defaultTextStyle>
   <p:extLst>
     <p:ext uri="{EFAFB233-063F-42B5-8137-9DF3F51BA10A}">
-      <p15:sldGuideLst xmlns:p15="http://schemas.microsoft.com/office/powerpoint/2012/main">
+      <p15:sldGuideLst xmlns:p15="http://schemas.microsoft.com/office/powerpoint/2012/main" xmlns="">
         <p15:guide id="1" orient="horz" pos="2160">
           <p15:clr>
             <a:srgbClr val="A4A3A4"/>
@@ -748,6 +750,7 @@
           <a:p>
             <a:fld id="{D5B6FE0E-E995-460A-817B-0AD9FDC1D6FC}" type="datetimeFigureOut">
               <a:rPr lang="en-NZ" smtClean="0"/>
+              <a:pPr/>
               <a:t>9/05/2018</a:t>
             </a:fld>
             <a:endParaRPr lang="en-NZ"/>
@@ -810,6 +813,7 @@
           <a:p>
             <a:fld id="{14A224D7-A1DF-4177-BF39-2D791CA88609}" type="slidenum">
               <a:rPr lang="en-NZ" smtClean="0"/>
+              <a:pPr/>
               <a:t>‹#›</a:t>
             </a:fld>
             <a:endParaRPr lang="en-NZ"/>
@@ -937,6 +941,7 @@
           <a:p>
             <a:fld id="{D5B6FE0E-E995-460A-817B-0AD9FDC1D6FC}" type="datetimeFigureOut">
               <a:rPr lang="en-NZ" smtClean="0"/>
+              <a:pPr/>
               <a:t>9/05/2018</a:t>
             </a:fld>
             <a:endParaRPr lang="en-NZ"/>
@@ -979,6 +984,7 @@
           <a:p>
             <a:fld id="{14A224D7-A1DF-4177-BF39-2D791CA88609}" type="slidenum">
               <a:rPr lang="en-NZ" smtClean="0"/>
+              <a:pPr/>
               <a:t>‹#›</a:t>
             </a:fld>
             <a:endParaRPr lang="en-NZ"/>
@@ -1111,6 +1117,7 @@
           <a:p>
             <a:fld id="{D5B6FE0E-E995-460A-817B-0AD9FDC1D6FC}" type="datetimeFigureOut">
               <a:rPr lang="en-NZ" smtClean="0"/>
+              <a:pPr/>
               <a:t>9/05/2018</a:t>
             </a:fld>
             <a:endParaRPr lang="en-NZ"/>
@@ -1153,6 +1160,7 @@
           <a:p>
             <a:fld id="{14A224D7-A1DF-4177-BF39-2D791CA88609}" type="slidenum">
               <a:rPr lang="en-NZ" smtClean="0"/>
+              <a:pPr/>
               <a:t>‹#›</a:t>
             </a:fld>
             <a:endParaRPr lang="en-NZ"/>
@@ -1253,6 +1261,7 @@
           <a:p>
             <a:fld id="{D5B6FE0E-E995-460A-817B-0AD9FDC1D6FC}" type="datetimeFigureOut">
               <a:rPr lang="en-NZ" smtClean="0"/>
+              <a:pPr/>
               <a:t>9/05/2018</a:t>
             </a:fld>
             <a:endParaRPr lang="en-NZ"/>
@@ -1295,6 +1304,7 @@
           <a:p>
             <a:fld id="{14A224D7-A1DF-4177-BF39-2D791CA88609}" type="slidenum">
               <a:rPr lang="en-NZ" smtClean="0"/>
+              <a:pPr/>
               <a:t>‹#›</a:t>
             </a:fld>
             <a:endParaRPr lang="en-NZ"/>
@@ -1498,6 +1508,7 @@
           <a:p>
             <a:fld id="{D5B6FE0E-E995-460A-817B-0AD9FDC1D6FC}" type="datetimeFigureOut">
               <a:rPr lang="en-NZ" smtClean="0"/>
+              <a:pPr/>
               <a:t>9/05/2018</a:t>
             </a:fld>
             <a:endParaRPr lang="en-NZ"/>
@@ -1540,6 +1551,7 @@
           <a:p>
             <a:fld id="{14A224D7-A1DF-4177-BF39-2D791CA88609}" type="slidenum">
               <a:rPr lang="en-NZ" smtClean="0"/>
+              <a:pPr/>
               <a:t>‹#›</a:t>
             </a:fld>
             <a:endParaRPr lang="en-NZ"/>
@@ -1897,6 +1909,7 @@
           <a:p>
             <a:fld id="{D5B6FE0E-E995-460A-817B-0AD9FDC1D6FC}" type="datetimeFigureOut">
               <a:rPr lang="en-NZ" smtClean="0"/>
+              <a:pPr/>
               <a:t>9/05/2018</a:t>
             </a:fld>
             <a:endParaRPr lang="en-NZ"/>
@@ -1939,6 +1952,7 @@
           <a:p>
             <a:fld id="{14A224D7-A1DF-4177-BF39-2D791CA88609}" type="slidenum">
               <a:rPr lang="en-NZ" smtClean="0"/>
+              <a:pPr/>
               <a:t>‹#›</a:t>
             </a:fld>
             <a:endParaRPr lang="en-NZ"/>
@@ -2333,6 +2347,7 @@
           <a:p>
             <a:fld id="{D5B6FE0E-E995-460A-817B-0AD9FDC1D6FC}" type="datetimeFigureOut">
               <a:rPr lang="en-NZ" smtClean="0"/>
+              <a:pPr/>
               <a:t>9/05/2018</a:t>
             </a:fld>
             <a:endParaRPr lang="en-NZ"/>
@@ -2375,6 +2390,7 @@
           <a:p>
             <a:fld id="{14A224D7-A1DF-4177-BF39-2D791CA88609}" type="slidenum">
               <a:rPr lang="en-NZ" smtClean="0"/>
+              <a:pPr/>
               <a:t>‹#›</a:t>
             </a:fld>
             <a:endParaRPr lang="en-NZ"/>
@@ -2428,6 +2444,7 @@
           <a:p>
             <a:fld id="{D5B6FE0E-E995-460A-817B-0AD9FDC1D6FC}" type="datetimeFigureOut">
               <a:rPr lang="en-NZ" smtClean="0"/>
+              <a:pPr/>
               <a:t>9/05/2018</a:t>
             </a:fld>
             <a:endParaRPr lang="en-NZ"/>
@@ -2470,6 +2487,7 @@
           <a:p>
             <a:fld id="{14A224D7-A1DF-4177-BF39-2D791CA88609}" type="slidenum">
               <a:rPr lang="en-NZ" smtClean="0"/>
+              <a:pPr/>
               <a:t>‹#›</a:t>
             </a:fld>
             <a:endParaRPr lang="en-NZ"/>
@@ -2540,6 +2558,7 @@
           <a:p>
             <a:fld id="{D5B6FE0E-E995-460A-817B-0AD9FDC1D6FC}" type="datetimeFigureOut">
               <a:rPr lang="en-NZ" smtClean="0"/>
+              <a:pPr/>
               <a:t>9/05/2018</a:t>
             </a:fld>
             <a:endParaRPr lang="en-NZ"/>
@@ -2582,6 +2601,7 @@
           <a:p>
             <a:fld id="{14A224D7-A1DF-4177-BF39-2D791CA88609}" type="slidenum">
               <a:rPr lang="en-NZ" smtClean="0"/>
+              <a:pPr/>
               <a:t>‹#›</a:t>
             </a:fld>
             <a:endParaRPr lang="en-NZ"/>
@@ -2807,6 +2827,7 @@
           <a:p>
             <a:fld id="{D5B6FE0E-E995-460A-817B-0AD9FDC1D6FC}" type="datetimeFigureOut">
               <a:rPr lang="en-NZ" smtClean="0"/>
+              <a:pPr/>
               <a:t>9/05/2018</a:t>
             </a:fld>
             <a:endParaRPr lang="en-NZ"/>
@@ -2849,6 +2870,7 @@
           <a:p>
             <a:fld id="{14A224D7-A1DF-4177-BF39-2D791CA88609}" type="slidenum">
               <a:rPr lang="en-NZ" smtClean="0"/>
+              <a:pPr/>
               <a:t>‹#›</a:t>
             </a:fld>
             <a:endParaRPr lang="en-NZ"/>
@@ -3008,6 +3030,7 @@
           <a:p>
             <a:fld id="{D5B6FE0E-E995-460A-817B-0AD9FDC1D6FC}" type="datetimeFigureOut">
               <a:rPr lang="en-NZ" smtClean="0"/>
+              <a:pPr/>
               <a:t>9/05/2018</a:t>
             </a:fld>
             <a:endParaRPr lang="en-NZ"/>
@@ -3073,6 +3096,7 @@
           <a:p>
             <a:fld id="{14A224D7-A1DF-4177-BF39-2D791CA88609}" type="slidenum">
               <a:rPr lang="en-NZ" smtClean="0"/>
+              <a:pPr/>
               <a:t>‹#›</a:t>
             </a:fld>
             <a:endParaRPr lang="en-NZ"/>
@@ -4094,6 +4118,7 @@
           <a:p>
             <a:fld id="{D5B6FE0E-E995-460A-817B-0AD9FDC1D6FC}" type="datetimeFigureOut">
               <a:rPr lang="en-NZ" smtClean="0"/>
+              <a:pPr/>
               <a:t>9/05/2018</a:t>
             </a:fld>
             <a:endParaRPr lang="en-NZ"/>
@@ -4170,6 +4195,7 @@
           <a:p>
             <a:fld id="{14A224D7-A1DF-4177-BF39-2D791CA88609}" type="slidenum">
               <a:rPr lang="en-NZ" smtClean="0"/>
+              <a:pPr/>
               <a:t>‹#›</a:t>
             </a:fld>
             <a:endParaRPr lang="en-NZ"/>
@@ -4503,60 +4529,369 @@
       </p:grpSpPr>
       <p:sp>
         <p:nvSpPr>
-          <p:cNvPr id="2" name="Title 1"/>
-          <p:cNvSpPr>
-            <a:spLocks noGrp="1"/>
-          </p:cNvSpPr>
-          <p:nvPr>
-            <p:ph type="ctrTitle"/>
+          <p:cNvPr id="2" name="Content Placeholder 1"/>
+          <p:cNvSpPr>
+            <a:spLocks noGrp="1"/>
+          </p:cNvSpPr>
+          <p:nvPr>
+            <p:ph idx="1"/>
           </p:nvPr>
         </p:nvSpPr>
         <p:spPr/>
         <p:txBody>
           <a:bodyPr>
-            <a:normAutofit fontScale="90000"/>
+            <a:normAutofit/>
           </a:bodyPr>
           <a:lstStyle/>
           <a:p>
-            <a:r>
-              <a:rPr lang="en-NZ" dirty="0"/>
-              <a:t>Designing an Object Detection System</a:t>
-            </a:r>
-            <a:br>
-              <a:rPr lang="en-NZ" dirty="0"/>
-            </a:br>
-            <a:r>
-              <a:rPr lang="en-NZ" sz="4400" dirty="0"/>
-              <a:t>Phase 2</a:t>
-            </a:r>
-            <a:endParaRPr lang="en-NZ" dirty="0"/>
-          </a:p>
-        </p:txBody>
-      </p:sp>
-      <p:sp>
-        <p:nvSpPr>
-          <p:cNvPr id="3" name="Subtitle 2"/>
-          <p:cNvSpPr>
-            <a:spLocks noGrp="1"/>
-          </p:cNvSpPr>
-          <p:nvPr>
-            <p:ph type="subTitle" idx="1"/>
-          </p:nvPr>
-        </p:nvSpPr>
-        <p:spPr>
-          <a:xfrm>
-            <a:off x="611560" y="3501008"/>
-            <a:ext cx="7772400" cy="1199704"/>
-          </a:xfrm>
-        </p:spPr>
+            <a:pPr>
+              <a:buFont typeface="Wingdings" pitchFamily="2" charset="2"/>
+              <a:buChar char="q"/>
+            </a:pPr>
+            <a:r>
+              <a:rPr lang="en-NZ" sz="1200" dirty="0" smtClean="0"/>
+              <a:t>If </a:t>
+            </a:r>
+            <a:r>
+              <a:rPr lang="en-NZ" sz="1200" dirty="0" smtClean="0"/>
+              <a:t>we need </a:t>
+            </a:r>
+            <a:r>
+              <a:rPr lang="en-NZ" sz="1200" dirty="0" smtClean="0"/>
+              <a:t>to support both a single stage filter and a double stage filter, can </a:t>
+            </a:r>
+            <a:r>
+              <a:rPr lang="en-NZ" sz="1200" dirty="0" smtClean="0"/>
+              <a:t>we reuse </a:t>
+            </a:r>
+            <a:r>
+              <a:rPr lang="en-NZ" sz="1200" dirty="0" smtClean="0"/>
+              <a:t>the hardware from the second stage when you only need a single stage filter</a:t>
+            </a:r>
+            <a:r>
+              <a:rPr lang="en-NZ" sz="1200" dirty="0" smtClean="0"/>
+              <a:t>?</a:t>
+            </a:r>
+          </a:p>
+          <a:p>
+            <a:pPr>
+              <a:buFont typeface="Wingdings" pitchFamily="2" charset="2"/>
+              <a:buChar char="q"/>
+            </a:pPr>
+            <a:endParaRPr lang="en-NZ" sz="1200" dirty="0" smtClean="0"/>
+          </a:p>
+          <a:p>
+            <a:pPr>
+              <a:buFont typeface="Wingdings" pitchFamily="2" charset="2"/>
+              <a:buChar char="q"/>
+            </a:pPr>
+            <a:r>
+              <a:rPr lang="en-NZ" sz="1200" dirty="0" smtClean="0"/>
+              <a:t>How much control does the HPS have over the operations performed</a:t>
+            </a:r>
+            <a:r>
+              <a:rPr lang="en-NZ" sz="1200" dirty="0" smtClean="0"/>
+              <a:t>?</a:t>
+            </a:r>
+          </a:p>
+          <a:p>
+            <a:pPr>
+              <a:buFont typeface="Wingdings" pitchFamily="2" charset="2"/>
+              <a:buChar char="q"/>
+            </a:pPr>
+            <a:endParaRPr lang="en-NZ" sz="1200" dirty="0" smtClean="0"/>
+          </a:p>
+          <a:p>
+            <a:pPr>
+              <a:buFont typeface="Wingdings" pitchFamily="2" charset="2"/>
+              <a:buChar char="q"/>
+            </a:pPr>
+            <a:r>
+              <a:rPr lang="en-NZ" sz="1200" dirty="0" smtClean="0"/>
+              <a:t>Can </a:t>
+            </a:r>
+            <a:r>
+              <a:rPr lang="en-NZ" sz="1200" dirty="0" smtClean="0"/>
+              <a:t>we share </a:t>
+            </a:r>
+            <a:r>
+              <a:rPr lang="en-NZ" sz="1200" dirty="0" smtClean="0"/>
+              <a:t>data between adjacent windows to reduce the amount of loading required</a:t>
+            </a:r>
+            <a:r>
+              <a:rPr lang="en-NZ" sz="1200" dirty="0" smtClean="0"/>
+              <a:t>?</a:t>
+            </a:r>
+          </a:p>
+          <a:p>
+            <a:pPr>
+              <a:buFont typeface="Wingdings" pitchFamily="2" charset="2"/>
+              <a:buChar char="q"/>
+            </a:pPr>
+            <a:endParaRPr lang="en-NZ" sz="1200" dirty="0" smtClean="0"/>
+          </a:p>
+          <a:p>
+            <a:pPr>
+              <a:buFont typeface="Wingdings" pitchFamily="2" charset="2"/>
+              <a:buChar char="q"/>
+            </a:pPr>
+            <a:r>
+              <a:rPr lang="en-NZ" sz="1200" dirty="0" smtClean="0"/>
+              <a:t>How separable are </a:t>
+            </a:r>
+            <a:r>
+              <a:rPr lang="en-NZ" sz="1200" dirty="0" smtClean="0"/>
+              <a:t>our filters? </a:t>
+            </a:r>
+          </a:p>
+          <a:p>
+            <a:pPr lvl="1">
+              <a:buFont typeface="Wingdings" pitchFamily="2" charset="2"/>
+              <a:buChar char="q"/>
+            </a:pPr>
+            <a:r>
+              <a:rPr lang="en-NZ" sz="800" dirty="0" smtClean="0"/>
+              <a:t>Can we break </a:t>
+            </a:r>
+            <a:r>
+              <a:rPr lang="en-NZ" sz="800" dirty="0" smtClean="0"/>
+              <a:t>down </a:t>
+            </a:r>
+            <a:r>
+              <a:rPr lang="en-NZ" sz="800" dirty="0" smtClean="0"/>
+              <a:t>our </a:t>
+            </a:r>
+            <a:r>
+              <a:rPr lang="en-NZ" sz="800" dirty="0" smtClean="0"/>
+              <a:t>input to operate on multiple independent parts at </a:t>
+            </a:r>
+            <a:r>
+              <a:rPr lang="en-NZ" sz="800" dirty="0" smtClean="0"/>
+              <a:t>once?</a:t>
+            </a:r>
+          </a:p>
+          <a:p>
+            <a:pPr lvl="1">
+              <a:buFont typeface="Wingdings" pitchFamily="2" charset="2"/>
+              <a:buChar char="q"/>
+            </a:pPr>
+            <a:r>
+              <a:rPr lang="en-NZ" sz="800" dirty="0" smtClean="0"/>
+              <a:t>What about multiple adjacent parts at once</a:t>
+            </a:r>
+            <a:r>
+              <a:rPr lang="en-NZ" sz="800" dirty="0" smtClean="0"/>
+              <a:t>?</a:t>
+            </a:r>
+          </a:p>
+          <a:p>
+            <a:pPr>
+              <a:buFont typeface="Wingdings" pitchFamily="2" charset="2"/>
+              <a:buChar char="q"/>
+            </a:pPr>
+            <a:endParaRPr lang="en-NZ" sz="1200" dirty="0" smtClean="0"/>
+          </a:p>
+          <a:p>
+            <a:pPr>
+              <a:buFont typeface="Wingdings" pitchFamily="2" charset="2"/>
+              <a:buChar char="q"/>
+            </a:pPr>
+            <a:r>
+              <a:rPr lang="en-NZ" sz="1200" dirty="0" smtClean="0"/>
+              <a:t>How can </a:t>
+            </a:r>
+            <a:r>
+              <a:rPr lang="en-NZ" sz="1200" dirty="0" smtClean="0"/>
+              <a:t>the image data </a:t>
+            </a:r>
+            <a:r>
+              <a:rPr lang="en-NZ" sz="1200" dirty="0" smtClean="0"/>
+              <a:t>be </a:t>
+            </a:r>
+            <a:r>
+              <a:rPr lang="en-NZ" sz="1200" dirty="0" smtClean="0"/>
+              <a:t>used for the required processing</a:t>
+            </a:r>
+            <a:r>
+              <a:rPr lang="en-NZ" sz="1200" dirty="0" smtClean="0"/>
+              <a:t>?</a:t>
+            </a:r>
+          </a:p>
+          <a:p>
+            <a:pPr lvl="1">
+              <a:buFont typeface="Wingdings" pitchFamily="2" charset="2"/>
+              <a:buChar char="q"/>
+            </a:pPr>
+            <a:r>
+              <a:rPr lang="en-NZ" sz="800" dirty="0" smtClean="0"/>
+              <a:t>Can </a:t>
+            </a:r>
+            <a:r>
+              <a:rPr lang="en-NZ" sz="800" dirty="0" smtClean="0"/>
+              <a:t>we use </a:t>
+            </a:r>
+            <a:r>
+              <a:rPr lang="en-NZ" sz="800" dirty="0" smtClean="0"/>
+              <a:t>less than the full data width of all three (RGB) channels</a:t>
+            </a:r>
+            <a:r>
+              <a:rPr lang="en-NZ" sz="800" dirty="0" smtClean="0"/>
+              <a:t>?</a:t>
+            </a:r>
+          </a:p>
+          <a:p>
+            <a:pPr lvl="1">
+              <a:buFont typeface="Wingdings" pitchFamily="2" charset="2"/>
+              <a:buChar char="q"/>
+            </a:pPr>
+            <a:r>
+              <a:rPr lang="en-NZ" sz="800" dirty="0" smtClean="0"/>
+              <a:t>Do </a:t>
+            </a:r>
+            <a:r>
+              <a:rPr lang="en-NZ" sz="800" dirty="0" smtClean="0"/>
+              <a:t>we only </a:t>
+            </a:r>
+            <a:r>
+              <a:rPr lang="en-NZ" sz="800" dirty="0" smtClean="0"/>
+              <a:t>need greyscale data?</a:t>
+            </a:r>
+          </a:p>
+          <a:p>
+            <a:pPr lvl="1">
+              <a:buFont typeface="Wingdings" pitchFamily="2" charset="2"/>
+              <a:buChar char="q"/>
+            </a:pPr>
+            <a:r>
+              <a:rPr lang="en-NZ" sz="800" dirty="0" smtClean="0"/>
+              <a:t>Can </a:t>
+            </a:r>
+            <a:r>
+              <a:rPr lang="en-NZ" sz="800" dirty="0" smtClean="0"/>
+              <a:t>we pack </a:t>
+            </a:r>
+            <a:r>
+              <a:rPr lang="en-NZ" sz="800" dirty="0" smtClean="0"/>
+              <a:t>the data to use the communication available more efficiently?</a:t>
+            </a:r>
+            <a:endParaRPr lang="en-NZ" sz="800" dirty="0" smtClean="0"/>
+          </a:p>
+          <a:p>
+            <a:pPr>
+              <a:buFont typeface="Wingdings" pitchFamily="2" charset="2"/>
+              <a:buChar char="q"/>
+            </a:pPr>
+            <a:endParaRPr lang="en-NZ" sz="1200" dirty="0" smtClean="0"/>
+          </a:p>
+          <a:p>
+            <a:pPr>
+              <a:buFont typeface="Wingdings" pitchFamily="2" charset="2"/>
+              <a:buChar char="q"/>
+            </a:pPr>
+            <a:r>
+              <a:rPr lang="en-NZ" sz="1200" dirty="0" smtClean="0"/>
+              <a:t>How can </a:t>
+            </a:r>
+            <a:r>
+              <a:rPr lang="en-NZ" sz="1200" dirty="0" smtClean="0"/>
+              <a:t>we make </a:t>
+            </a:r>
+            <a:r>
+              <a:rPr lang="en-NZ" sz="1200" dirty="0" smtClean="0"/>
+              <a:t>sure that the hardware is used efficiently</a:t>
+            </a:r>
+            <a:r>
+              <a:rPr lang="en-NZ" sz="1200" dirty="0" smtClean="0"/>
+              <a:t>?</a:t>
+            </a:r>
+          </a:p>
+          <a:p>
+            <a:pPr lvl="1">
+              <a:buFont typeface="Wingdings" pitchFamily="2" charset="2"/>
+              <a:buChar char="q"/>
+            </a:pPr>
+            <a:r>
+              <a:rPr lang="en-NZ" sz="800" dirty="0" smtClean="0"/>
+              <a:t>What if </a:t>
+            </a:r>
+            <a:r>
+              <a:rPr lang="en-NZ" sz="800" dirty="0" smtClean="0"/>
+              <a:t>we include </a:t>
+            </a:r>
+            <a:r>
+              <a:rPr lang="en-NZ" sz="800" dirty="0" smtClean="0"/>
+              <a:t>an additional hardware component?</a:t>
+            </a:r>
+            <a:endParaRPr lang="en-NZ" sz="800" dirty="0" smtClean="0"/>
+          </a:p>
+          <a:p>
+            <a:pPr>
+              <a:buFont typeface="Wingdings" pitchFamily="2" charset="2"/>
+              <a:buChar char="q"/>
+            </a:pPr>
+            <a:endParaRPr lang="en-NZ" sz="1200" dirty="0" smtClean="0"/>
+          </a:p>
+          <a:p>
+            <a:pPr>
+              <a:buFont typeface="Wingdings" pitchFamily="2" charset="2"/>
+              <a:buChar char="q"/>
+            </a:pPr>
+            <a:r>
+              <a:rPr lang="en-NZ" sz="1200" dirty="0" smtClean="0"/>
+              <a:t>Our filtered </a:t>
+            </a:r>
+            <a:r>
+              <a:rPr lang="en-NZ" sz="1200" dirty="0" smtClean="0"/>
+              <a:t>result must be available for the HPS to use later for object detection.</a:t>
+            </a:r>
+          </a:p>
+          <a:p>
+            <a:pPr lvl="1">
+              <a:buFont typeface="Wingdings" pitchFamily="2" charset="2"/>
+              <a:buChar char="q"/>
+            </a:pPr>
+            <a:r>
+              <a:rPr lang="en-NZ" sz="800" dirty="0" smtClean="0"/>
+              <a:t>o How do </a:t>
+            </a:r>
+            <a:r>
+              <a:rPr lang="en-NZ" sz="800" dirty="0" smtClean="0"/>
+              <a:t>we manage </a:t>
+            </a:r>
+            <a:r>
+              <a:rPr lang="en-NZ" sz="800" dirty="0" smtClean="0"/>
+              <a:t>loading image data onto the FPGA as well as the pre-processed data back off?</a:t>
+            </a:r>
+          </a:p>
+          <a:p>
+            <a:pPr lvl="1"/>
+            <a:endParaRPr lang="en-NZ" sz="800" dirty="0" smtClean="0"/>
+          </a:p>
+          <a:p>
+            <a:endParaRPr lang="en-NZ" sz="1200" dirty="0" smtClean="0"/>
+          </a:p>
+        </p:txBody>
+      </p:sp>
+      <p:sp>
+        <p:nvSpPr>
+          <p:cNvPr id="3" name="Title 2"/>
+          <p:cNvSpPr>
+            <a:spLocks noGrp="1"/>
+          </p:cNvSpPr>
+          <p:nvPr>
+            <p:ph type="title"/>
+          </p:nvPr>
+        </p:nvSpPr>
+        <p:spPr/>
         <p:txBody>
           <a:bodyPr/>
           <a:lstStyle/>
           <a:p>
             <a:r>
-              <a:rPr lang="en-NZ" dirty="0"/>
-              <a:t>Group 4</a:t>
-            </a:r>
+              <a:rPr lang="en-NZ" dirty="0" smtClean="0"/>
+              <a:t>Checklist of points to consider</a:t>
+            </a:r>
+            <a:endParaRPr lang="en-NZ" dirty="0"/>
           </a:p>
         </p:txBody>
       </p:sp>
@@ -4597,96 +4932,166 @@
         </p:nvSpPr>
         <p:spPr/>
         <p:txBody>
+          <a:bodyPr>
+            <a:normAutofit/>
+          </a:bodyPr>
+          <a:lstStyle/>
+          <a:p>
+            <a:pPr>
+              <a:buFont typeface="Wingdings" pitchFamily="2" charset="2"/>
+              <a:buChar char="q"/>
+            </a:pPr>
+            <a:r>
+              <a:rPr lang="en-NZ" sz="1200" dirty="0" smtClean="0"/>
+              <a:t>A plan for </a:t>
+            </a:r>
+            <a:r>
+              <a:rPr lang="en-NZ" sz="1200" dirty="0" smtClean="0"/>
+              <a:t>our implemented </a:t>
+            </a:r>
+            <a:r>
+              <a:rPr lang="en-NZ" sz="1200" dirty="0" smtClean="0"/>
+              <a:t>co-processor, detailing the interfaces used and some example use </a:t>
+            </a:r>
+            <a:r>
+              <a:rPr lang="en-NZ" sz="1200" dirty="0" smtClean="0"/>
+              <a:t>cases.</a:t>
+            </a:r>
+          </a:p>
+          <a:p>
+            <a:pPr>
+              <a:buFont typeface="Wingdings" pitchFamily="2" charset="2"/>
+              <a:buChar char="q"/>
+            </a:pPr>
+            <a:endParaRPr lang="en-NZ" sz="1200" dirty="0" smtClean="0"/>
+          </a:p>
+          <a:p>
+            <a:pPr>
+              <a:buFont typeface="Wingdings" pitchFamily="2" charset="2"/>
+              <a:buChar char="q"/>
+            </a:pPr>
+            <a:r>
+              <a:rPr lang="en-NZ" sz="1200" dirty="0" smtClean="0"/>
+              <a:t>This </a:t>
+            </a:r>
+            <a:r>
+              <a:rPr lang="en-NZ" sz="1200" dirty="0" smtClean="0"/>
+              <a:t>includes diagrams of our control unit FSM as well as the datapath, potentially shown as multiple </a:t>
+            </a:r>
+            <a:r>
+              <a:rPr lang="en-NZ" sz="1200" dirty="0" err="1" smtClean="0"/>
+              <a:t>datapaths</a:t>
+            </a:r>
+            <a:r>
+              <a:rPr lang="en-NZ" sz="1200" dirty="0" smtClean="0"/>
+              <a:t> where </a:t>
+            </a:r>
+            <a:r>
+              <a:rPr lang="en-NZ" sz="1200" dirty="0" err="1" smtClean="0"/>
+              <a:t>muxes</a:t>
+            </a:r>
+            <a:r>
+              <a:rPr lang="en-NZ" sz="1200" dirty="0" smtClean="0"/>
+              <a:t> have been configured according to a specified filter setup.</a:t>
+            </a:r>
+          </a:p>
+          <a:p>
+            <a:pPr>
+              <a:buFont typeface="Wingdings" pitchFamily="2" charset="2"/>
+              <a:buChar char="q"/>
+            </a:pPr>
+            <a:endParaRPr lang="en-NZ" sz="1200" dirty="0" smtClean="0"/>
+          </a:p>
+          <a:p>
+            <a:pPr>
+              <a:buFont typeface="Wingdings" pitchFamily="2" charset="2"/>
+              <a:buChar char="q"/>
+            </a:pPr>
+            <a:r>
+              <a:rPr lang="en-NZ" sz="1200" dirty="0" smtClean="0"/>
+              <a:t>We </a:t>
+            </a:r>
+            <a:r>
+              <a:rPr lang="en-NZ" sz="1200" dirty="0" smtClean="0"/>
+              <a:t>will also need to produce a “data sheet” which explains the memory-mapped registers we make available to software, their functions (i.e. control or status registers, and the “meaning” of each bit), as well as an outline of the steps that need to be performed in order to set up our IP block</a:t>
+            </a:r>
+            <a:r>
+              <a:rPr lang="en-NZ" sz="1200" dirty="0" smtClean="0"/>
+              <a:t>.</a:t>
+            </a:r>
+          </a:p>
+          <a:p>
+            <a:pPr>
+              <a:buFont typeface="Wingdings" pitchFamily="2" charset="2"/>
+              <a:buChar char="q"/>
+            </a:pPr>
+            <a:endParaRPr lang="en-NZ" sz="1200" dirty="0" smtClean="0"/>
+          </a:p>
+          <a:p>
+            <a:pPr>
+              <a:buFont typeface="Wingdings" pitchFamily="2" charset="2"/>
+              <a:buChar char="q"/>
+            </a:pPr>
+            <a:r>
+              <a:rPr lang="en-NZ" sz="1200" dirty="0" smtClean="0"/>
+              <a:t>Demonstration </a:t>
+            </a:r>
+            <a:r>
+              <a:rPr lang="en-NZ" sz="1200" dirty="0" smtClean="0"/>
+              <a:t>of correct setup functionality, shown through simulation</a:t>
+            </a:r>
+            <a:r>
+              <a:rPr lang="en-NZ" sz="1200" dirty="0" smtClean="0"/>
+              <a:t>.</a:t>
+            </a:r>
+            <a:endParaRPr lang="en-NZ" sz="1200" dirty="0" smtClean="0"/>
+          </a:p>
+          <a:p>
+            <a:pPr>
+              <a:buFont typeface="Wingdings" pitchFamily="2" charset="2"/>
+              <a:buChar char="q"/>
+            </a:pPr>
+            <a:endParaRPr lang="en-NZ" sz="1200" dirty="0" smtClean="0"/>
+          </a:p>
+          <a:p>
+            <a:pPr>
+              <a:buFont typeface="Wingdings" pitchFamily="2" charset="2"/>
+              <a:buChar char="q"/>
+            </a:pPr>
+            <a:r>
+              <a:rPr lang="en-NZ" sz="1200" dirty="0" smtClean="0"/>
+              <a:t>This means being able to provide the necessary commands to our co-processor to allow for setup of various filters.</a:t>
+            </a:r>
+          </a:p>
+          <a:p>
+            <a:pPr>
+              <a:buFont typeface="Wingdings" pitchFamily="2" charset="2"/>
+              <a:buChar char="q"/>
+            </a:pPr>
+            <a:endParaRPr lang="en-NZ" sz="1200" dirty="0" smtClean="0"/>
+          </a:p>
+        </p:txBody>
+      </p:sp>
+      <p:sp>
+        <p:nvSpPr>
+          <p:cNvPr id="3" name="Title 2"/>
+          <p:cNvSpPr>
+            <a:spLocks noGrp="1"/>
+          </p:cNvSpPr>
+          <p:nvPr>
+            <p:ph type="title"/>
+          </p:nvPr>
+        </p:nvSpPr>
+        <p:spPr/>
+        <p:txBody>
           <a:bodyPr/>
           <a:lstStyle/>
           <a:p>
             <a:r>
-              <a:rPr lang="en-NZ" dirty="0"/>
-              <a:t>Filters implemented in hardware:</a:t>
-            </a:r>
-          </a:p>
-          <a:p>
-            <a:pPr lvl="1"/>
-            <a:r>
-              <a:rPr lang="en-NZ" dirty="0"/>
-              <a:t>Sobel filter</a:t>
-            </a:r>
-          </a:p>
-          <a:p>
-            <a:pPr lvl="1"/>
-            <a:r>
-              <a:rPr lang="en-NZ" dirty="0"/>
-              <a:t>Convolution filter</a:t>
-            </a:r>
-          </a:p>
-          <a:p>
-            <a:pPr lvl="1"/>
-            <a:r>
-              <a:rPr lang="en-NZ" dirty="0"/>
-              <a:t>Median filter</a:t>
-            </a:r>
-          </a:p>
-          <a:p>
-            <a:pPr marL="393192" lvl="1" indent="0">
-              <a:buNone/>
-            </a:pPr>
+              <a:rPr lang="en-NZ" dirty="0" smtClean="0"/>
+              <a:t>Checklist of expectations</a:t>
+            </a:r>
             <a:endParaRPr lang="en-NZ" dirty="0"/>
-          </a:p>
-          <a:p>
-            <a:r>
-              <a:rPr lang="en-NZ" dirty="0"/>
-              <a:t>Bi-directional HPS – FPGA interface</a:t>
-            </a:r>
-          </a:p>
-          <a:p>
-            <a:endParaRPr lang="en-NZ" dirty="0"/>
-          </a:p>
-          <a:p>
-            <a:r>
-              <a:rPr lang="en-NZ" dirty="0"/>
-              <a:t>C code in full control of filtering hardware</a:t>
-            </a:r>
-          </a:p>
-          <a:p>
-            <a:pPr lvl="1"/>
-            <a:r>
-              <a:rPr lang="en-NZ" dirty="0"/>
-              <a:t>No FSM required</a:t>
-            </a:r>
-          </a:p>
-          <a:p>
-            <a:endParaRPr lang="en-NZ" dirty="0"/>
-          </a:p>
-          <a:p>
-            <a:endParaRPr lang="en-NZ" dirty="0"/>
-          </a:p>
-          <a:p>
-            <a:endParaRPr lang="en-NZ" dirty="0"/>
-          </a:p>
-          <a:p>
-            <a:endParaRPr lang="en-NZ" dirty="0"/>
-          </a:p>
-        </p:txBody>
-      </p:sp>
-      <p:sp>
-        <p:nvSpPr>
-          <p:cNvPr id="3" name="Title 2"/>
-          <p:cNvSpPr>
-            <a:spLocks noGrp="1"/>
-          </p:cNvSpPr>
-          <p:nvPr>
-            <p:ph type="title"/>
-          </p:nvPr>
-        </p:nvSpPr>
-        <p:spPr/>
-        <p:txBody>
-          <a:bodyPr/>
-          <a:lstStyle/>
-          <a:p>
-            <a:r>
-              <a:rPr lang="en-NZ" dirty="0"/>
-              <a:t>Implementation</a:t>
-            </a:r>
           </a:p>
         </p:txBody>
       </p:sp>
@@ -4717,6 +5122,220 @@
       </p:grpSpPr>
       <p:sp>
         <p:nvSpPr>
+          <p:cNvPr id="2" name="Title 1"/>
+          <p:cNvSpPr>
+            <a:spLocks noGrp="1"/>
+          </p:cNvSpPr>
+          <p:nvPr>
+            <p:ph type="ctrTitle"/>
+          </p:nvPr>
+        </p:nvSpPr>
+        <p:spPr/>
+        <p:txBody>
+          <a:bodyPr>
+            <a:normAutofit fontScale="90000"/>
+          </a:bodyPr>
+          <a:lstStyle/>
+          <a:p>
+            <a:r>
+              <a:rPr lang="en-NZ" dirty="0"/>
+              <a:t>Designing an Object Detection System</a:t>
+            </a:r>
+            <a:br>
+              <a:rPr lang="en-NZ" dirty="0"/>
+            </a:br>
+            <a:r>
+              <a:rPr lang="en-NZ" sz="4400" dirty="0"/>
+              <a:t>Phase 2</a:t>
+            </a:r>
+            <a:endParaRPr lang="en-NZ" dirty="0"/>
+          </a:p>
+        </p:txBody>
+      </p:sp>
+      <p:sp>
+        <p:nvSpPr>
+          <p:cNvPr id="3" name="Subtitle 2"/>
+          <p:cNvSpPr>
+            <a:spLocks noGrp="1"/>
+          </p:cNvSpPr>
+          <p:nvPr>
+            <p:ph type="subTitle" idx="1"/>
+          </p:nvPr>
+        </p:nvSpPr>
+        <p:spPr>
+          <a:xfrm>
+            <a:off x="611560" y="3501008"/>
+            <a:ext cx="7772400" cy="1199704"/>
+          </a:xfrm>
+        </p:spPr>
+        <p:txBody>
+          <a:bodyPr/>
+          <a:lstStyle/>
+          <a:p>
+            <a:r>
+              <a:rPr lang="en-NZ" dirty="0"/>
+              <a:t>Group 4</a:t>
+            </a:r>
+          </a:p>
+        </p:txBody>
+      </p:sp>
+    </p:spTree>
+  </p:cSld>
+  <p:clrMapOvr>
+    <a:masterClrMapping/>
+  </p:clrMapOvr>
+</p:sld>
+</file>
+
+<file path=ppt/slides/slide4.xml><?xml version="1.0" encoding="utf-8"?>
+<p:sld xmlns:a="http://schemas.openxmlformats.org/drawingml/2006/main" xmlns:r="http://schemas.openxmlformats.org/officeDocument/2006/relationships" xmlns:p="http://schemas.openxmlformats.org/presentationml/2006/main">
+  <p:cSld>
+    <p:spTree>
+      <p:nvGrpSpPr>
+        <p:cNvPr id="1" name=""/>
+        <p:cNvGrpSpPr/>
+        <p:nvPr/>
+      </p:nvGrpSpPr>
+      <p:grpSpPr>
+        <a:xfrm>
+          <a:off x="0" y="0"/>
+          <a:ext cx="0" cy="0"/>
+          <a:chOff x="0" y="0"/>
+          <a:chExt cx="0" cy="0"/>
+        </a:xfrm>
+      </p:grpSpPr>
+      <p:sp>
+        <p:nvSpPr>
+          <p:cNvPr id="2" name="Content Placeholder 1"/>
+          <p:cNvSpPr>
+            <a:spLocks noGrp="1"/>
+          </p:cNvSpPr>
+          <p:nvPr>
+            <p:ph idx="1"/>
+          </p:nvPr>
+        </p:nvSpPr>
+        <p:spPr/>
+        <p:txBody>
+          <a:bodyPr/>
+          <a:lstStyle/>
+          <a:p>
+            <a:r>
+              <a:rPr lang="en-NZ" dirty="0"/>
+              <a:t>Filters implemented in hardware:</a:t>
+            </a:r>
+          </a:p>
+          <a:p>
+            <a:pPr lvl="1"/>
+            <a:r>
+              <a:rPr lang="en-NZ" dirty="0"/>
+              <a:t>Sobel filter</a:t>
+            </a:r>
+          </a:p>
+          <a:p>
+            <a:pPr lvl="1"/>
+            <a:r>
+              <a:rPr lang="en-NZ" dirty="0"/>
+              <a:t>Convolution filter</a:t>
+            </a:r>
+          </a:p>
+          <a:p>
+            <a:pPr lvl="1"/>
+            <a:r>
+              <a:rPr lang="en-NZ" dirty="0"/>
+              <a:t>Median filter</a:t>
+            </a:r>
+          </a:p>
+          <a:p>
+            <a:pPr marL="393192" lvl="1" indent="0">
+              <a:buNone/>
+            </a:pPr>
+            <a:endParaRPr lang="en-NZ" dirty="0"/>
+          </a:p>
+          <a:p>
+            <a:r>
+              <a:rPr lang="en-NZ" dirty="0"/>
+              <a:t>Bi-directional HPS – FPGA interface</a:t>
+            </a:r>
+          </a:p>
+          <a:p>
+            <a:endParaRPr lang="en-NZ" dirty="0"/>
+          </a:p>
+          <a:p>
+            <a:r>
+              <a:rPr lang="en-NZ" dirty="0"/>
+              <a:t>C code in full control of filtering hardware</a:t>
+            </a:r>
+          </a:p>
+          <a:p>
+            <a:pPr lvl="1"/>
+            <a:r>
+              <a:rPr lang="en-NZ" dirty="0"/>
+              <a:t>No FSM required</a:t>
+            </a:r>
+          </a:p>
+          <a:p>
+            <a:endParaRPr lang="en-NZ" dirty="0"/>
+          </a:p>
+          <a:p>
+            <a:endParaRPr lang="en-NZ" dirty="0"/>
+          </a:p>
+          <a:p>
+            <a:endParaRPr lang="en-NZ" dirty="0"/>
+          </a:p>
+          <a:p>
+            <a:endParaRPr lang="en-NZ" dirty="0"/>
+          </a:p>
+        </p:txBody>
+      </p:sp>
+      <p:sp>
+        <p:nvSpPr>
+          <p:cNvPr id="3" name="Title 2"/>
+          <p:cNvSpPr>
+            <a:spLocks noGrp="1"/>
+          </p:cNvSpPr>
+          <p:nvPr>
+            <p:ph type="title"/>
+          </p:nvPr>
+        </p:nvSpPr>
+        <p:spPr/>
+        <p:txBody>
+          <a:bodyPr/>
+          <a:lstStyle/>
+          <a:p>
+            <a:r>
+              <a:rPr lang="en-NZ" dirty="0"/>
+              <a:t>Implementation</a:t>
+            </a:r>
+          </a:p>
+        </p:txBody>
+      </p:sp>
+    </p:spTree>
+  </p:cSld>
+  <p:clrMapOvr>
+    <a:masterClrMapping/>
+  </p:clrMapOvr>
+</p:sld>
+</file>
+
+<file path=ppt/slides/slide5.xml><?xml version="1.0" encoding="utf-8"?>
+<p:sld xmlns:a="http://schemas.openxmlformats.org/drawingml/2006/main" xmlns:r="http://schemas.openxmlformats.org/officeDocument/2006/relationships" xmlns:p="http://schemas.openxmlformats.org/presentationml/2006/main">
+  <p:cSld>
+    <p:spTree>
+      <p:nvGrpSpPr>
+        <p:cNvPr id="1" name=""/>
+        <p:cNvGrpSpPr/>
+        <p:nvPr/>
+      </p:nvGrpSpPr>
+      <p:grpSpPr>
+        <a:xfrm>
+          <a:off x="0" y="0"/>
+          <a:ext cx="0" cy="0"/>
+          <a:chOff x="0" y="0"/>
+          <a:chExt cx="0" cy="0"/>
+        </a:xfrm>
+      </p:grpSpPr>
+      <p:sp>
+        <p:nvSpPr>
           <p:cNvPr id="3" name="Title 2"/>
           <p:cNvSpPr>
             <a:spLocks noGrp="1"/>
@@ -4748,10 +5367,10 @@
           </p:nvPr>
         </p:nvPicPr>
         <p:blipFill>
-          <a:blip r:embed="rId2">
+          <a:blip r:embed="rId2" cstate="print">
             <a:extLst>
               <a:ext uri="{28A0092B-C50C-407E-A947-70E740481C1C}">
-                <a14:useLocalDpi xmlns:a14="http://schemas.microsoft.com/office/drawing/2010/main" val="0"/>
+                <a14:useLocalDpi xmlns:a14="http://schemas.microsoft.com/office/drawing/2010/main" xmlns="" val="0"/>
               </a:ext>
             </a:extLst>
           </a:blip>
@@ -4775,10 +5394,10 @@
           <p:nvPr/>
         </p:nvPicPr>
         <p:blipFill>
-          <a:blip r:embed="rId3">
+          <a:blip r:embed="rId3" cstate="print">
             <a:extLst>
               <a:ext uri="{28A0092B-C50C-407E-A947-70E740481C1C}">
-                <a14:useLocalDpi xmlns:a14="http://schemas.microsoft.com/office/drawing/2010/main" val="0"/>
+                <a14:useLocalDpi xmlns:a14="http://schemas.microsoft.com/office/drawing/2010/main" xmlns="" val="0"/>
               </a:ext>
             </a:extLst>
           </a:blip>
@@ -4805,10 +5424,10 @@
           <p:nvPr/>
         </p:nvPicPr>
         <p:blipFill>
-          <a:blip r:embed="rId4">
+          <a:blip r:embed="rId4" cstate="print">
             <a:extLst>
               <a:ext uri="{28A0092B-C50C-407E-A947-70E740481C1C}">
-                <a14:useLocalDpi xmlns:a14="http://schemas.microsoft.com/office/drawing/2010/main" val="0"/>
+                <a14:useLocalDpi xmlns:a14="http://schemas.microsoft.com/office/drawing/2010/main" xmlns="" val="0"/>
               </a:ext>
             </a:extLst>
           </a:blip>
@@ -4834,7 +5453,7 @@
 </p:sld>
 </file>
 
-<file path=ppt/slides/slide4.xml><?xml version="1.0" encoding="utf-8"?>
+<file path=ppt/slides/slide6.xml><?xml version="1.0" encoding="utf-8"?>
 <p:sld xmlns:a="http://schemas.openxmlformats.org/drawingml/2006/main" xmlns:r="http://schemas.openxmlformats.org/officeDocument/2006/relationships" xmlns:p="http://schemas.openxmlformats.org/presentationml/2006/main">
   <p:cSld>
     <p:spTree>
@@ -4903,7 +5522,7 @@
 </p:sld>
 </file>
 
-<file path=ppt/slides/slide5.xml><?xml version="1.0" encoding="utf-8"?>
+<file path=ppt/slides/slide7.xml><?xml version="1.0" encoding="utf-8"?>
 <p:sld xmlns:a="http://schemas.openxmlformats.org/drawingml/2006/main" xmlns:r="http://schemas.openxmlformats.org/officeDocument/2006/relationships" xmlns:p="http://schemas.openxmlformats.org/presentationml/2006/main">
   <p:cSld>
     <p:spTree>
@@ -5002,7 +5621,7 @@
 </p:sld>
 </file>
 
-<file path=ppt/slides/slide6.xml><?xml version="1.0" encoding="utf-8"?>
+<file path=ppt/slides/slide8.xml><?xml version="1.0" encoding="utf-8"?>
 <p:sld xmlns:a="http://schemas.openxmlformats.org/drawingml/2006/main" xmlns:r="http://schemas.openxmlformats.org/officeDocument/2006/relationships" xmlns:p="http://schemas.openxmlformats.org/presentationml/2006/main">
   <p:cSld>
     <p:spTree>
@@ -5043,21 +5662,21 @@
                 <a:gridCol w="725805">
                   <a:extLst>
                     <a:ext uri="{9D8B030D-6E8A-4147-A177-3AD203B41FA5}">
-                      <a16:colId xmlns:a16="http://schemas.microsoft.com/office/drawing/2014/main" val="20000"/>
+                      <a16:colId xmlns:a16="http://schemas.microsoft.com/office/drawing/2014/main" xmlns="" val="20000"/>
                     </a:ext>
                   </a:extLst>
                 </a:gridCol>
                 <a:gridCol w="725805">
                   <a:extLst>
                     <a:ext uri="{9D8B030D-6E8A-4147-A177-3AD203B41FA5}">
-                      <a16:colId xmlns:a16="http://schemas.microsoft.com/office/drawing/2014/main" val="20001"/>
+                      <a16:colId xmlns:a16="http://schemas.microsoft.com/office/drawing/2014/main" xmlns="" val="20001"/>
                     </a:ext>
                   </a:extLst>
                 </a:gridCol>
                 <a:gridCol w="725805">
                   <a:extLst>
                     <a:ext uri="{9D8B030D-6E8A-4147-A177-3AD203B41FA5}">
-                      <a16:colId xmlns:a16="http://schemas.microsoft.com/office/drawing/2014/main" val="20002"/>
+                      <a16:colId xmlns:a16="http://schemas.microsoft.com/office/drawing/2014/main" xmlns="" val="20002"/>
                     </a:ext>
                   </a:extLst>
                 </a:gridCol>
@@ -5138,7 +5757,7 @@
                 </a:tc>
                 <a:extLst>
                   <a:ext uri="{0D108BD9-81ED-4DB2-BD59-A6C34878D82A}">
-                    <a16:rowId xmlns:a16="http://schemas.microsoft.com/office/drawing/2014/main" val="10000"/>
+                    <a16:rowId xmlns:a16="http://schemas.microsoft.com/office/drawing/2014/main" xmlns="" val="10000"/>
                   </a:ext>
                 </a:extLst>
               </a:tr>
@@ -5235,7 +5854,7 @@
                 </a:tc>
                 <a:extLst>
                   <a:ext uri="{0D108BD9-81ED-4DB2-BD59-A6C34878D82A}">
-                    <a16:rowId xmlns:a16="http://schemas.microsoft.com/office/drawing/2014/main" val="10001"/>
+                    <a16:rowId xmlns:a16="http://schemas.microsoft.com/office/drawing/2014/main" xmlns="" val="10001"/>
                   </a:ext>
                 </a:extLst>
               </a:tr>
@@ -5332,7 +5951,7 @@
                 </a:tc>
                 <a:extLst>
                   <a:ext uri="{0D108BD9-81ED-4DB2-BD59-A6C34878D82A}">
-                    <a16:rowId xmlns:a16="http://schemas.microsoft.com/office/drawing/2014/main" val="10002"/>
+                    <a16:rowId xmlns:a16="http://schemas.microsoft.com/office/drawing/2014/main" xmlns="" val="10002"/>
                   </a:ext>
                 </a:extLst>
               </a:tr>
@@ -6509,7 +7128,7 @@
 </p:sld>
 </file>
 
-<file path=ppt/slides/slide7.xml><?xml version="1.0" encoding="utf-8"?>
+<file path=ppt/slides/slide9.xml><?xml version="1.0" encoding="utf-8"?>
 <p:sld xmlns:a="http://schemas.openxmlformats.org/drawingml/2006/main" xmlns:r="http://schemas.openxmlformats.org/officeDocument/2006/relationships" xmlns:p="http://schemas.openxmlformats.org/presentationml/2006/main">
   <p:cSld>
     <p:spTree>
@@ -6531,7 +7150,7 @@
           <p:cNvPr id="2" name="Content Placeholder 1">
             <a:extLst>
               <a:ext uri="{FF2B5EF4-FFF2-40B4-BE49-F238E27FC236}">
-                <a16:creationId xmlns:a16="http://schemas.microsoft.com/office/drawing/2014/main" id="{98B83A58-84CA-4E02-82FA-25670C7FACD1}"/>
+                <a16:creationId xmlns:a16="http://schemas.microsoft.com/office/drawing/2014/main" xmlns="" id="{98B83A58-84CA-4E02-82FA-25670C7FACD1}"/>
               </a:ext>
             </a:extLst>
           </p:cNvPr>
@@ -6613,7 +7232,7 @@
           <p:cNvPr id="3" name="Title 2">
             <a:extLst>
               <a:ext uri="{FF2B5EF4-FFF2-40B4-BE49-F238E27FC236}">
-                <a16:creationId xmlns:a16="http://schemas.microsoft.com/office/drawing/2014/main" id="{0A443042-959B-43C1-9BDC-92AF808F3459}"/>
+                <a16:creationId xmlns:a16="http://schemas.microsoft.com/office/drawing/2014/main" xmlns="" id="{0A443042-959B-43C1-9BDC-92AF808F3459}"/>
               </a:ext>
             </a:extLst>
           </p:cNvPr>
@@ -6639,7 +7258,7 @@
     </p:spTree>
     <p:extLst>
       <p:ext uri="{BB962C8B-B14F-4D97-AF65-F5344CB8AC3E}">
-        <p14:creationId xmlns:p14="http://schemas.microsoft.com/office/powerpoint/2010/main" val="844473139"/>
+        <p14:creationId xmlns:p14="http://schemas.microsoft.com/office/powerpoint/2010/main" xmlns="" val="844473139"/>
       </p:ext>
     </p:extLst>
   </p:cSld>

</xml_diff>

<commit_message>
Hid the first two slides
</commit_message>
<xml_diff>
--- a/documentation/Phase2.pptx
+++ b/documentation/Phase2.pptx
@@ -117,7 +117,7 @@
   </p:defaultTextStyle>
   <p:extLst>
     <p:ext uri="{EFAFB233-063F-42B5-8137-9DF3F51BA10A}">
-      <p15:sldGuideLst xmlns:p15="http://schemas.microsoft.com/office/powerpoint/2012/main">
+      <p15:sldGuideLst xmlns:p15="http://schemas.microsoft.com/office/powerpoint/2012/main" xmlns="">
         <p15:guide id="1" orient="horz" pos="2160">
           <p15:clr>
             <a:srgbClr val="A4A3A4"/>
@@ -220,7 +220,8 @@
           <a:p>
             <a:fld id="{61CE3006-EDA6-47CF-991F-682241BC2761}" type="datetimeFigureOut">
               <a:rPr lang="en-NZ" smtClean="0"/>
-              <a:t>9/05/2018</a:t>
+              <a:pPr/>
+              <a:t>10/05/2018</a:t>
             </a:fld>
             <a:endParaRPr lang="en-NZ"/>
           </a:p>
@@ -379,6 +380,7 @@
           <a:p>
             <a:fld id="{82762D3C-8831-450F-BB95-DC27521811D1}" type="slidenum">
               <a:rPr lang="en-NZ" smtClean="0"/>
+              <a:pPr/>
               <a:t>‹#›</a:t>
             </a:fld>
             <a:endParaRPr lang="en-NZ"/>
@@ -388,7 +390,7 @@
     </p:spTree>
     <p:extLst>
       <p:ext uri="{BB962C8B-B14F-4D97-AF65-F5344CB8AC3E}">
-        <p14:creationId xmlns:p14="http://schemas.microsoft.com/office/powerpoint/2010/main" val="1702445391"/>
+        <p14:creationId xmlns:p14="http://schemas.microsoft.com/office/powerpoint/2010/main" xmlns="" val="1702445391"/>
       </p:ext>
     </p:extLst>
   </p:cSld>
@@ -553,6 +555,7 @@
           <a:p>
             <a:fld id="{82762D3C-8831-450F-BB95-DC27521811D1}" type="slidenum">
               <a:rPr lang="en-NZ" smtClean="0"/>
+              <a:pPr/>
               <a:t>9</a:t>
             </a:fld>
             <a:endParaRPr lang="en-NZ"/>
@@ -562,7 +565,7 @@
     </p:spTree>
     <p:extLst>
       <p:ext uri="{BB962C8B-B14F-4D97-AF65-F5344CB8AC3E}">
-        <p14:creationId xmlns:p14="http://schemas.microsoft.com/office/powerpoint/2010/main" val="1737993360"/>
+        <p14:creationId xmlns:p14="http://schemas.microsoft.com/office/powerpoint/2010/main" xmlns="" val="1737993360"/>
       </p:ext>
     </p:extLst>
   </p:cSld>
@@ -1188,7 +1191,7 @@
             <a:fld id="{D5B6FE0E-E995-460A-817B-0AD9FDC1D6FC}" type="datetimeFigureOut">
               <a:rPr lang="en-NZ" smtClean="0"/>
               <a:pPr/>
-              <a:t>9/05/2018</a:t>
+              <a:t>10/05/2018</a:t>
             </a:fld>
             <a:endParaRPr lang="en-NZ"/>
           </a:p>
@@ -1379,7 +1382,7 @@
             <a:fld id="{D5B6FE0E-E995-460A-817B-0AD9FDC1D6FC}" type="datetimeFigureOut">
               <a:rPr lang="en-NZ" smtClean="0"/>
               <a:pPr/>
-              <a:t>9/05/2018</a:t>
+              <a:t>10/05/2018</a:t>
             </a:fld>
             <a:endParaRPr lang="en-NZ"/>
           </a:p>
@@ -1555,7 +1558,7 @@
             <a:fld id="{D5B6FE0E-E995-460A-817B-0AD9FDC1D6FC}" type="datetimeFigureOut">
               <a:rPr lang="en-NZ" smtClean="0"/>
               <a:pPr/>
-              <a:t>9/05/2018</a:t>
+              <a:t>10/05/2018</a:t>
             </a:fld>
             <a:endParaRPr lang="en-NZ"/>
           </a:p>
@@ -1699,7 +1702,7 @@
             <a:fld id="{D5B6FE0E-E995-460A-817B-0AD9FDC1D6FC}" type="datetimeFigureOut">
               <a:rPr lang="en-NZ" smtClean="0"/>
               <a:pPr/>
-              <a:t>9/05/2018</a:t>
+              <a:t>10/05/2018</a:t>
             </a:fld>
             <a:endParaRPr lang="en-NZ"/>
           </a:p>
@@ -1946,7 +1949,7 @@
             <a:fld id="{D5B6FE0E-E995-460A-817B-0AD9FDC1D6FC}" type="datetimeFigureOut">
               <a:rPr lang="en-NZ" smtClean="0"/>
               <a:pPr/>
-              <a:t>9/05/2018</a:t>
+              <a:t>10/05/2018</a:t>
             </a:fld>
             <a:endParaRPr lang="en-NZ"/>
           </a:p>
@@ -2347,7 +2350,7 @@
             <a:fld id="{D5B6FE0E-E995-460A-817B-0AD9FDC1D6FC}" type="datetimeFigureOut">
               <a:rPr lang="en-NZ" smtClean="0"/>
               <a:pPr/>
-              <a:t>9/05/2018</a:t>
+              <a:t>10/05/2018</a:t>
             </a:fld>
             <a:endParaRPr lang="en-NZ"/>
           </a:p>
@@ -2785,7 +2788,7 @@
             <a:fld id="{D5B6FE0E-E995-460A-817B-0AD9FDC1D6FC}" type="datetimeFigureOut">
               <a:rPr lang="en-NZ" smtClean="0"/>
               <a:pPr/>
-              <a:t>9/05/2018</a:t>
+              <a:t>10/05/2018</a:t>
             </a:fld>
             <a:endParaRPr lang="en-NZ"/>
           </a:p>
@@ -2882,7 +2885,7 @@
             <a:fld id="{D5B6FE0E-E995-460A-817B-0AD9FDC1D6FC}" type="datetimeFigureOut">
               <a:rPr lang="en-NZ" smtClean="0"/>
               <a:pPr/>
-              <a:t>9/05/2018</a:t>
+              <a:t>10/05/2018</a:t>
             </a:fld>
             <a:endParaRPr lang="en-NZ"/>
           </a:p>
@@ -2996,7 +2999,7 @@
             <a:fld id="{D5B6FE0E-E995-460A-817B-0AD9FDC1D6FC}" type="datetimeFigureOut">
               <a:rPr lang="en-NZ" smtClean="0"/>
               <a:pPr/>
-              <a:t>9/05/2018</a:t>
+              <a:t>10/05/2018</a:t>
             </a:fld>
             <a:endParaRPr lang="en-NZ"/>
           </a:p>
@@ -3265,7 +3268,7 @@
             <a:fld id="{D5B6FE0E-E995-460A-817B-0AD9FDC1D6FC}" type="datetimeFigureOut">
               <a:rPr lang="en-NZ" smtClean="0"/>
               <a:pPr/>
-              <a:t>9/05/2018</a:t>
+              <a:t>10/05/2018</a:t>
             </a:fld>
             <a:endParaRPr lang="en-NZ"/>
           </a:p>
@@ -3468,7 +3471,7 @@
             <a:fld id="{D5B6FE0E-E995-460A-817B-0AD9FDC1D6FC}" type="datetimeFigureOut">
               <a:rPr lang="en-NZ" smtClean="0"/>
               <a:pPr/>
-              <a:t>9/05/2018</a:t>
+              <a:t>10/05/2018</a:t>
             </a:fld>
             <a:endParaRPr lang="en-NZ"/>
           </a:p>
@@ -4556,7 +4559,7 @@
             <a:fld id="{D5B6FE0E-E995-460A-817B-0AD9FDC1D6FC}" type="datetimeFigureOut">
               <a:rPr lang="en-NZ" smtClean="0"/>
               <a:pPr/>
-              <a:t>9/05/2018</a:t>
+              <a:t>10/05/2018</a:t>
             </a:fld>
             <a:endParaRPr lang="en-NZ"/>
           </a:p>
@@ -4948,7 +4951,7 @@
 </file>
 
 <file path=ppt/slides/slide1.xml><?xml version="1.0" encoding="utf-8"?>
-<p:sld xmlns:a="http://schemas.openxmlformats.org/drawingml/2006/main" xmlns:r="http://schemas.openxmlformats.org/officeDocument/2006/relationships" xmlns:p="http://schemas.openxmlformats.org/presentationml/2006/main">
+<p:sld xmlns:a="http://schemas.openxmlformats.org/drawingml/2006/main" xmlns:r="http://schemas.openxmlformats.org/officeDocument/2006/relationships" xmlns:p="http://schemas.openxmlformats.org/presentationml/2006/main" show="0">
   <p:cSld>
     <p:spTree>
       <p:nvGrpSpPr>
@@ -5198,11 +5201,19 @@
   <p:clrMapOvr>
     <a:masterClrMapping/>
   </p:clrMapOvr>
+  <p:transition/>
+  <p:timing>
+    <p:tnLst>
+      <p:par>
+        <p:cTn id="1" dur="indefinite" restart="never" nodeType="tmRoot"/>
+      </p:par>
+    </p:tnLst>
+  </p:timing>
 </p:sld>
 </file>
 
 <file path=ppt/slides/slide2.xml><?xml version="1.0" encoding="utf-8"?>
-<p:sld xmlns:a="http://schemas.openxmlformats.org/drawingml/2006/main" xmlns:r="http://schemas.openxmlformats.org/officeDocument/2006/relationships" xmlns:p="http://schemas.openxmlformats.org/presentationml/2006/main">
+<p:sld xmlns:a="http://schemas.openxmlformats.org/drawingml/2006/main" xmlns:r="http://schemas.openxmlformats.org/officeDocument/2006/relationships" xmlns:p="http://schemas.openxmlformats.org/presentationml/2006/main" show="0">
   <p:cSld>
     <p:spTree>
       <p:nvGrpSpPr>
@@ -5364,6 +5375,14 @@
   <p:clrMapOvr>
     <a:masterClrMapping/>
   </p:clrMapOvr>
+  <p:transition/>
+  <p:timing>
+    <p:tnLst>
+      <p:par>
+        <p:cTn id="1" dur="indefinite" restart="never" nodeType="tmRoot"/>
+      </p:par>
+    </p:tnLst>
+  </p:timing>
 </p:sld>
 </file>
 
@@ -5448,6 +5467,13 @@
   <p:clrMapOvr>
     <a:masterClrMapping/>
   </p:clrMapOvr>
+  <p:timing>
+    <p:tnLst>
+      <p:par>
+        <p:cTn id="1" dur="indefinite" restart="never" nodeType="tmRoot"/>
+      </p:par>
+    </p:tnLst>
+  </p:timing>
 </p:sld>
 </file>
 
@@ -5578,6 +5604,13 @@
   <p:clrMapOvr>
     <a:masterClrMapping/>
   </p:clrMapOvr>
+  <p:timing>
+    <p:tnLst>
+      <p:par>
+        <p:cTn id="1" dur="indefinite" restart="never" nodeType="tmRoot"/>
+      </p:par>
+    </p:tnLst>
+  </p:timing>
 </p:sld>
 </file>
 
@@ -5634,7 +5667,7 @@
           <a:blip r:embed="rId2" cstate="print">
             <a:extLst>
               <a:ext uri="{28A0092B-C50C-407E-A947-70E740481C1C}">
-                <a14:useLocalDpi xmlns:a14="http://schemas.microsoft.com/office/drawing/2010/main" val="0"/>
+                <a14:useLocalDpi xmlns:a14="http://schemas.microsoft.com/office/drawing/2010/main" xmlns="" val="0"/>
               </a:ext>
             </a:extLst>
           </a:blip>
@@ -5661,7 +5694,7 @@
           <a:blip r:embed="rId3" cstate="print">
             <a:extLst>
               <a:ext uri="{28A0092B-C50C-407E-A947-70E740481C1C}">
-                <a14:useLocalDpi xmlns:a14="http://schemas.microsoft.com/office/drawing/2010/main" val="0"/>
+                <a14:useLocalDpi xmlns:a14="http://schemas.microsoft.com/office/drawing/2010/main" xmlns="" val="0"/>
               </a:ext>
             </a:extLst>
           </a:blip>
@@ -5691,7 +5724,7 @@
           <a:blip r:embed="rId4" cstate="print">
             <a:extLst>
               <a:ext uri="{28A0092B-C50C-407E-A947-70E740481C1C}">
-                <a14:useLocalDpi xmlns:a14="http://schemas.microsoft.com/office/drawing/2010/main" val="0"/>
+                <a14:useLocalDpi xmlns:a14="http://schemas.microsoft.com/office/drawing/2010/main" xmlns="" val="0"/>
               </a:ext>
             </a:extLst>
           </a:blip>
@@ -5714,7 +5747,7 @@
           <p:cNvPr id="8" name="Content Placeholder 1">
             <a:extLst>
               <a:ext uri="{FF2B5EF4-FFF2-40B4-BE49-F238E27FC236}">
-                <a16:creationId xmlns:a16="http://schemas.microsoft.com/office/drawing/2014/main" id="{26C63CB9-BBF0-4F24-BCB2-3A37876DFE5E}"/>
+                <a16:creationId xmlns:a16="http://schemas.microsoft.com/office/drawing/2014/main" xmlns="" id="{26C63CB9-BBF0-4F24-BCB2-3A37876DFE5E}"/>
               </a:ext>
             </a:extLst>
           </p:cNvPr>
@@ -5970,6 +6003,13 @@
   <p:clrMapOvr>
     <a:masterClrMapping/>
   </p:clrMapOvr>
+  <p:timing>
+    <p:tnLst>
+      <p:par>
+        <p:cTn id="1" dur="indefinite" restart="never" nodeType="tmRoot"/>
+      </p:par>
+    </p:tnLst>
+  </p:timing>
 </p:sld>
 </file>
 
@@ -6069,6 +6109,13 @@
   <p:clrMapOvr>
     <a:masterClrMapping/>
   </p:clrMapOvr>
+  <p:timing>
+    <p:tnLst>
+      <p:par>
+        <p:cTn id="1" dur="indefinite" restart="never" nodeType="tmRoot"/>
+      </p:par>
+    </p:tnLst>
+  </p:timing>
 </p:sld>
 </file>
 
@@ -6113,21 +6160,21 @@
                 <a:gridCol w="725805">
                   <a:extLst>
                     <a:ext uri="{9D8B030D-6E8A-4147-A177-3AD203B41FA5}">
-                      <a16:colId xmlns:a16="http://schemas.microsoft.com/office/drawing/2014/main" val="20000"/>
+                      <a16:colId xmlns:a16="http://schemas.microsoft.com/office/drawing/2014/main" xmlns="" val="20000"/>
                     </a:ext>
                   </a:extLst>
                 </a:gridCol>
                 <a:gridCol w="725805">
                   <a:extLst>
                     <a:ext uri="{9D8B030D-6E8A-4147-A177-3AD203B41FA5}">
-                      <a16:colId xmlns:a16="http://schemas.microsoft.com/office/drawing/2014/main" val="20001"/>
+                      <a16:colId xmlns:a16="http://schemas.microsoft.com/office/drawing/2014/main" xmlns="" val="20001"/>
                     </a:ext>
                   </a:extLst>
                 </a:gridCol>
                 <a:gridCol w="725805">
                   <a:extLst>
                     <a:ext uri="{9D8B030D-6E8A-4147-A177-3AD203B41FA5}">
-                      <a16:colId xmlns:a16="http://schemas.microsoft.com/office/drawing/2014/main" val="20002"/>
+                      <a16:colId xmlns:a16="http://schemas.microsoft.com/office/drawing/2014/main" xmlns="" val="20002"/>
                     </a:ext>
                   </a:extLst>
                 </a:gridCol>
@@ -6208,7 +6255,7 @@
                 </a:tc>
                 <a:extLst>
                   <a:ext uri="{0D108BD9-81ED-4DB2-BD59-A6C34878D82A}">
-                    <a16:rowId xmlns:a16="http://schemas.microsoft.com/office/drawing/2014/main" val="10000"/>
+                    <a16:rowId xmlns:a16="http://schemas.microsoft.com/office/drawing/2014/main" xmlns="" val="10000"/>
                   </a:ext>
                 </a:extLst>
               </a:tr>
@@ -6305,7 +6352,7 @@
                 </a:tc>
                 <a:extLst>
                   <a:ext uri="{0D108BD9-81ED-4DB2-BD59-A6C34878D82A}">
-                    <a16:rowId xmlns:a16="http://schemas.microsoft.com/office/drawing/2014/main" val="10001"/>
+                    <a16:rowId xmlns:a16="http://schemas.microsoft.com/office/drawing/2014/main" xmlns="" val="10001"/>
                   </a:ext>
                 </a:extLst>
               </a:tr>
@@ -6402,7 +6449,7 @@
                 </a:tc>
                 <a:extLst>
                   <a:ext uri="{0D108BD9-81ED-4DB2-BD59-A6C34878D82A}">
-                    <a16:rowId xmlns:a16="http://schemas.microsoft.com/office/drawing/2014/main" val="10002"/>
+                    <a16:rowId xmlns:a16="http://schemas.microsoft.com/office/drawing/2014/main" xmlns="" val="10002"/>
                   </a:ext>
                 </a:extLst>
               </a:tr>
@@ -7576,6 +7623,171 @@
   <p:clrMapOvr>
     <a:masterClrMapping/>
   </p:clrMapOvr>
+  <p:timing>
+    <p:tnLst>
+      <p:par>
+        <p:cTn id="1" dur="indefinite" restart="never" nodeType="tmRoot">
+          <p:childTnLst>
+            <p:seq concurrent="1" nextAc="seek">
+              <p:cTn id="2" dur="indefinite" nodeType="mainSeq">
+                <p:childTnLst>
+                  <p:par>
+                    <p:cTn id="3" fill="hold">
+                      <p:stCondLst>
+                        <p:cond delay="indefinite"/>
+                      </p:stCondLst>
+                      <p:childTnLst>
+                        <p:par>
+                          <p:cTn id="4" fill="hold">
+                            <p:stCondLst>
+                              <p:cond delay="0"/>
+                            </p:stCondLst>
+                            <p:childTnLst>
+                              <p:par>
+                                <p:cTn id="5" presetID="1" presetClass="entr" presetSubtype="0" fill="hold" nodeType="clickEffect">
+                                  <p:stCondLst>
+                                    <p:cond delay="0"/>
+                                  </p:stCondLst>
+                                  <p:childTnLst>
+                                    <p:set>
+                                      <p:cBhvr>
+                                        <p:cTn id="6" dur="1" fill="hold">
+                                          <p:stCondLst>
+                                            <p:cond delay="0"/>
+                                          </p:stCondLst>
+                                        </p:cTn>
+                                        <p:tgtEl>
+                                          <p:spTgt spid="13"/>
+                                        </p:tgtEl>
+                                        <p:attrNameLst>
+                                          <p:attrName>style.visibility</p:attrName>
+                                        </p:attrNameLst>
+                                      </p:cBhvr>
+                                      <p:to>
+                                        <p:strVal val="visible"/>
+                                      </p:to>
+                                    </p:set>
+                                  </p:childTnLst>
+                                </p:cTn>
+                              </p:par>
+                            </p:childTnLst>
+                          </p:cTn>
+                        </p:par>
+                      </p:childTnLst>
+                    </p:cTn>
+                  </p:par>
+                  <p:par>
+                    <p:cTn id="7" fill="hold">
+                      <p:stCondLst>
+                        <p:cond delay="indefinite"/>
+                      </p:stCondLst>
+                      <p:childTnLst>
+                        <p:par>
+                          <p:cTn id="8" fill="hold">
+                            <p:stCondLst>
+                              <p:cond delay="0"/>
+                            </p:stCondLst>
+                            <p:childTnLst>
+                              <p:par>
+                                <p:cTn id="9" presetID="1" presetClass="entr" presetSubtype="0" fill="hold" nodeType="clickEffect">
+                                  <p:stCondLst>
+                                    <p:cond delay="0"/>
+                                  </p:stCondLst>
+                                  <p:childTnLst>
+                                    <p:set>
+                                      <p:cBhvr>
+                                        <p:cTn id="10" dur="1" fill="hold">
+                                          <p:stCondLst>
+                                            <p:cond delay="0"/>
+                                          </p:stCondLst>
+                                        </p:cTn>
+                                        <p:tgtEl>
+                                          <p:spTgt spid="14"/>
+                                        </p:tgtEl>
+                                        <p:attrNameLst>
+                                          <p:attrName>style.visibility</p:attrName>
+                                        </p:attrNameLst>
+                                      </p:cBhvr>
+                                      <p:to>
+                                        <p:strVal val="visible"/>
+                                      </p:to>
+                                    </p:set>
+                                  </p:childTnLst>
+                                </p:cTn>
+                              </p:par>
+                            </p:childTnLst>
+                          </p:cTn>
+                        </p:par>
+                      </p:childTnLst>
+                    </p:cTn>
+                  </p:par>
+                  <p:par>
+                    <p:cTn id="11" fill="hold">
+                      <p:stCondLst>
+                        <p:cond delay="indefinite"/>
+                      </p:stCondLst>
+                      <p:childTnLst>
+                        <p:par>
+                          <p:cTn id="12" fill="hold">
+                            <p:stCondLst>
+                              <p:cond delay="0"/>
+                            </p:stCondLst>
+                            <p:childTnLst>
+                              <p:par>
+                                <p:cTn id="13" presetID="1" presetClass="entr" presetSubtype="0" fill="hold" nodeType="clickEffect">
+                                  <p:stCondLst>
+                                    <p:cond delay="0"/>
+                                  </p:stCondLst>
+                                  <p:childTnLst>
+                                    <p:set>
+                                      <p:cBhvr>
+                                        <p:cTn id="14" dur="1" fill="hold">
+                                          <p:stCondLst>
+                                            <p:cond delay="0"/>
+                                          </p:stCondLst>
+                                        </p:cTn>
+                                        <p:tgtEl>
+                                          <p:spTgt spid="18"/>
+                                        </p:tgtEl>
+                                        <p:attrNameLst>
+                                          <p:attrName>style.visibility</p:attrName>
+                                        </p:attrNameLst>
+                                      </p:cBhvr>
+                                      <p:to>
+                                        <p:strVal val="visible"/>
+                                      </p:to>
+                                    </p:set>
+                                  </p:childTnLst>
+                                </p:cTn>
+                              </p:par>
+                            </p:childTnLst>
+                          </p:cTn>
+                        </p:par>
+                      </p:childTnLst>
+                    </p:cTn>
+                  </p:par>
+                </p:childTnLst>
+              </p:cTn>
+              <p:prevCondLst>
+                <p:cond evt="onPrev" delay="0">
+                  <p:tgtEl>
+                    <p:sldTgt/>
+                  </p:tgtEl>
+                </p:cond>
+              </p:prevCondLst>
+              <p:nextCondLst>
+                <p:cond evt="onNext" delay="0">
+                  <p:tgtEl>
+                    <p:sldTgt/>
+                  </p:tgtEl>
+                </p:cond>
+              </p:nextCondLst>
+            </p:seq>
+          </p:childTnLst>
+        </p:cTn>
+      </p:par>
+    </p:tnLst>
+  </p:timing>
 </p:sld>
 </file>
 
@@ -7650,7 +7862,7 @@
           <p:cNvPr id="4" name="Picture 3">
             <a:extLst>
               <a:ext uri="{FF2B5EF4-FFF2-40B4-BE49-F238E27FC236}">
-                <a16:creationId xmlns:a16="http://schemas.microsoft.com/office/drawing/2014/main" id="{39CFFE48-02F4-4ED1-8037-16658E32E8D3}"/>
+                <a16:creationId xmlns:a16="http://schemas.microsoft.com/office/drawing/2014/main" xmlns="" id="{39CFFE48-02F4-4ED1-8037-16658E32E8D3}"/>
               </a:ext>
             </a:extLst>
           </p:cNvPr>
@@ -7660,7 +7872,7 @@
           <p:nvPr/>
         </p:nvPicPr>
         <p:blipFill rotWithShape="1">
-          <a:blip r:embed="rId2"/>
+          <a:blip r:embed="rId2" cstate="print"/>
           <a:srcRect l="1246"/>
           <a:stretch/>
         </p:blipFill>
@@ -7679,7 +7891,7 @@
           <p:cNvPr id="5" name="Picture 4">
             <a:extLst>
               <a:ext uri="{FF2B5EF4-FFF2-40B4-BE49-F238E27FC236}">
-                <a16:creationId xmlns:a16="http://schemas.microsoft.com/office/drawing/2014/main" id="{DB7E5434-8586-451B-A83B-E6D5A4C16F16}"/>
+                <a16:creationId xmlns:a16="http://schemas.microsoft.com/office/drawing/2014/main" xmlns="" id="{DB7E5434-8586-451B-A83B-E6D5A4C16F16}"/>
               </a:ext>
             </a:extLst>
           </p:cNvPr>
@@ -7689,7 +7901,7 @@
           <p:nvPr/>
         </p:nvPicPr>
         <p:blipFill>
-          <a:blip r:embed="rId3"/>
+          <a:blip r:embed="rId3" cstate="print"/>
           <a:stretch>
             <a:fillRect/>
           </a:stretch>
@@ -7709,6 +7921,13 @@
   <p:clrMapOvr>
     <a:masterClrMapping/>
   </p:clrMapOvr>
+  <p:timing>
+    <p:tnLst>
+      <p:par>
+        <p:cTn id="1" dur="indefinite" restart="never" nodeType="tmRoot"/>
+      </p:par>
+    </p:tnLst>
+  </p:timing>
 </p:sld>
 </file>
 
@@ -7734,7 +7953,7 @@
           <p:cNvPr id="2" name="Content Placeholder 1">
             <a:extLst>
               <a:ext uri="{FF2B5EF4-FFF2-40B4-BE49-F238E27FC236}">
-                <a16:creationId xmlns:a16="http://schemas.microsoft.com/office/drawing/2014/main" id="{98B83A58-84CA-4E02-82FA-25670C7FACD1}"/>
+                <a16:creationId xmlns:a16="http://schemas.microsoft.com/office/drawing/2014/main" xmlns="" id="{98B83A58-84CA-4E02-82FA-25670C7FACD1}"/>
               </a:ext>
             </a:extLst>
           </p:cNvPr>
@@ -7816,7 +8035,7 @@
           <p:cNvPr id="3" name="Title 2">
             <a:extLst>
               <a:ext uri="{FF2B5EF4-FFF2-40B4-BE49-F238E27FC236}">
-                <a16:creationId xmlns:a16="http://schemas.microsoft.com/office/drawing/2014/main" id="{0A443042-959B-43C1-9BDC-92AF808F3459}"/>
+                <a16:creationId xmlns:a16="http://schemas.microsoft.com/office/drawing/2014/main" xmlns="" id="{0A443042-959B-43C1-9BDC-92AF808F3459}"/>
               </a:ext>
             </a:extLst>
           </p:cNvPr>
@@ -7842,13 +8061,20 @@
     </p:spTree>
     <p:extLst>
       <p:ext uri="{BB962C8B-B14F-4D97-AF65-F5344CB8AC3E}">
-        <p14:creationId xmlns:p14="http://schemas.microsoft.com/office/powerpoint/2010/main" val="844473139"/>
+        <p14:creationId xmlns:p14="http://schemas.microsoft.com/office/powerpoint/2010/main" xmlns="" val="844473139"/>
       </p:ext>
     </p:extLst>
   </p:cSld>
   <p:clrMapOvr>
     <a:masterClrMapping/>
   </p:clrMapOvr>
+  <p:timing>
+    <p:tnLst>
+      <p:par>
+        <p:cTn id="1" dur="indefinite" restart="never" nodeType="tmRoot"/>
+      </p:par>
+    </p:tnLst>
+  </p:timing>
 </p:sld>
 </file>
 
@@ -8180,7 +8406,7 @@
     </a:clrScheme>
     <a:fontScheme name="Office">
       <a:majorFont>
-        <a:latin typeface="Calibri Light" panose="020F0302020204030204"/>
+        <a:latin typeface="Calibri Light"/>
         <a:ea typeface=""/>
         <a:cs typeface=""/>
         <a:font script="Jpan" typeface="游ゴシック Light"/>
@@ -8232,7 +8458,7 @@
         <a:font script="Tfng" typeface="Ebrima"/>
       </a:majorFont>
       <a:minorFont>
-        <a:latin typeface="Calibri" panose="020F0502020204030204"/>
+        <a:latin typeface="Calibri"/>
         <a:ea typeface=""/>
         <a:cs typeface=""/>
         <a:font script="Jpan" typeface="游ゴシック"/>
@@ -8426,7 +8652,7 @@
   <a:extraClrSchemeLst/>
   <a:extLst>
     <a:ext uri="{05A4C25C-085E-4340-85A3-A5531E510DB2}">
-      <thm15:themeFamily xmlns:thm15="http://schemas.microsoft.com/office/thememl/2012/main" name="Office Theme" id="{62F939B6-93AF-4DB8-9C6B-D6C7DFDC589F}" vid="{4A3C46E8-61CC-4603-A589-7422A47A8E4A}"/>
+      <thm15:themeFamily xmlns:thm15="http://schemas.microsoft.com/office/thememl/2012/main" xmlns="" name="Office Theme" id="{62F939B6-93AF-4DB8-9C6B-D6C7DFDC589F}" vid="{4A3C46E8-61CC-4603-A589-7422A47A8E4A}"/>
     </a:ext>
   </a:extLst>
 </a:theme>

</xml_diff>